<commit_message>
Codigos Clase Numero 02 - Dia 16.09.2018
</commit_message>
<xml_diff>
--- a/CLASEDOS/DIAPOSITIVAS/CLASE_DOS.pptx
+++ b/CLASEDOS/DIAPOSITIVAS/CLASE_DOS.pptx
@@ -1556,7 +1556,7 @@
             <a:fld id="{48A87A34-81AB-432B-8DAE-1953F412C126}" type="datetimeFigureOut">
               <a:rPr lang="en-US" dirty="0"/>
               <a:pPr/>
-              <a:t>9/15/2018</a:t>
+              <a:t>9/16/2018</a:t>
             </a:fld>
             <a:endParaRPr lang="en-US" dirty="0"/>
           </a:p>
@@ -3010,7 +3010,7 @@
           <a:p>
             <a:fld id="{48A87A34-81AB-432B-8DAE-1953F412C126}" type="datetimeFigureOut">
               <a:rPr lang="en-US" dirty="0"/>
-              <a:t>9/15/2018</a:t>
+              <a:t>9/16/2018</a:t>
             </a:fld>
             <a:endParaRPr lang="en-US" dirty="0"/>
           </a:p>
@@ -4458,7 +4458,7 @@
           <a:p>
             <a:fld id="{48A87A34-81AB-432B-8DAE-1953F412C126}" type="datetimeFigureOut">
               <a:rPr lang="en-US" dirty="0"/>
-              <a:t>9/15/2018</a:t>
+              <a:t>9/16/2018</a:t>
             </a:fld>
             <a:endParaRPr lang="en-US" dirty="0"/>
           </a:p>
@@ -5908,7 +5908,7 @@
           <a:p>
             <a:fld id="{48A87A34-81AB-432B-8DAE-1953F412C126}" type="datetimeFigureOut">
               <a:rPr lang="en-US" dirty="0"/>
-              <a:t>9/15/2018</a:t>
+              <a:t>9/16/2018</a:t>
             </a:fld>
             <a:endParaRPr lang="en-US" dirty="0"/>
           </a:p>
@@ -7411,7 +7411,7 @@
           <a:p>
             <a:fld id="{48A87A34-81AB-432B-8DAE-1953F412C126}" type="datetimeFigureOut">
               <a:rPr lang="en-US" dirty="0"/>
-              <a:t>9/15/2018</a:t>
+              <a:t>9/16/2018</a:t>
             </a:fld>
             <a:endParaRPr lang="en-US" dirty="0"/>
           </a:p>
@@ -8927,7 +8927,7 @@
           <a:p>
             <a:fld id="{48A87A34-81AB-432B-8DAE-1953F412C126}" type="datetimeFigureOut">
               <a:rPr lang="en-US" dirty="0"/>
-              <a:t>9/15/2018</a:t>
+              <a:t>9/16/2018</a:t>
             </a:fld>
             <a:endParaRPr lang="en-US" dirty="0"/>
           </a:p>
@@ -10587,7 +10587,7 @@
           <a:p>
             <a:fld id="{48A87A34-81AB-432B-8DAE-1953F412C126}" type="datetimeFigureOut">
               <a:rPr lang="en-US" dirty="0"/>
-              <a:t>9/15/2018</a:t>
+              <a:t>9/16/2018</a:t>
             </a:fld>
             <a:endParaRPr lang="en-US" dirty="0"/>
           </a:p>
@@ -11980,7 +11980,7 @@
           <a:p>
             <a:fld id="{48A87A34-81AB-432B-8DAE-1953F412C126}" type="datetimeFigureOut">
               <a:rPr lang="en-US" dirty="0"/>
-              <a:t>9/15/2018</a:t>
+              <a:t>9/16/2018</a:t>
             </a:fld>
             <a:endParaRPr lang="en-US" dirty="0"/>
           </a:p>
@@ -12075,7 +12075,7 @@
           <a:p>
             <a:fld id="{48A87A34-81AB-432B-8DAE-1953F412C126}" type="datetimeFigureOut">
               <a:rPr lang="en-US" dirty="0"/>
-              <a:t>9/15/2018</a:t>
+              <a:t>9/16/2018</a:t>
             </a:fld>
             <a:endParaRPr lang="en-US" dirty="0"/>
           </a:p>
@@ -13596,7 +13596,7 @@
           <a:p>
             <a:fld id="{48A87A34-81AB-432B-8DAE-1953F412C126}" type="datetimeFigureOut">
               <a:rPr lang="en-US" dirty="0"/>
-              <a:t>9/15/2018</a:t>
+              <a:t>9/16/2018</a:t>
             </a:fld>
             <a:endParaRPr lang="en-US" dirty="0"/>
           </a:p>
@@ -15127,7 +15127,7 @@
           <a:p>
             <a:fld id="{48A87A34-81AB-432B-8DAE-1953F412C126}" type="datetimeFigureOut">
               <a:rPr lang="en-US" dirty="0"/>
-              <a:t>9/15/2018</a:t>
+              <a:t>9/16/2018</a:t>
             </a:fld>
             <a:endParaRPr lang="en-US" dirty="0"/>
           </a:p>
@@ -15373,7 +15373,7 @@
             <a:fld id="{48A87A34-81AB-432B-8DAE-1953F412C126}" type="datetimeFigureOut">
               <a:rPr lang="en-US" dirty="0"/>
               <a:pPr/>
-              <a:t>9/15/2018</a:t>
+              <a:t>9/16/2018</a:t>
             </a:fld>
             <a:endParaRPr lang="en-US" dirty="0"/>
           </a:p>
@@ -28103,25 +28103,7 @@
                 </a:solidFill>
                 <a:latin typeface="Arial" panose="020B0604020202020204" pitchFamily="34" charset="0"/>
               </a:rPr>
-              <a:t> </a:t>
-            </a:r>
-            <a:r>
-              <a:rPr lang="es-PE" dirty="0" smtClean="0">
-                <a:solidFill>
-                  <a:schemeClr val="bg1"/>
-                </a:solidFill>
-                <a:latin typeface="Arial" panose="020B0604020202020204" pitchFamily="34" charset="0"/>
-              </a:rPr>
-              <a:t>con la salvedad de que impide la inclusión de un mismo archivo </a:t>
-            </a:r>
-            <a:r>
-              <a:rPr lang="es-PE" dirty="0" smtClean="0">
-                <a:solidFill>
-                  <a:schemeClr val="bg1"/>
-                </a:solidFill>
-                <a:latin typeface="Arial" panose="020B0604020202020204" pitchFamily="34" charset="0"/>
-              </a:rPr>
-              <a:t>omitiéndolo.</a:t>
+              <a:t> con la salvedad de que impide la inclusión de un mismo archivo omitiéndolo.</a:t>
             </a:r>
             <a:endParaRPr lang="es-PE" dirty="0">
               <a:solidFill>

</xml_diff>

<commit_message>
Diapositivas clase  03 - 23.9.2018
</commit_message>
<xml_diff>
--- a/CLASEDOS/DIAPOSITIVAS/CLASE_DOS.pptx
+++ b/CLASEDOS/DIAPOSITIVAS/CLASE_DOS.pptx
@@ -22793,8 +22793,8 @@
         </p:blipFill>
         <p:spPr>
           <a:xfrm>
-            <a:off x="6503831" y="67606"/>
-            <a:ext cx="4636393" cy="6655166"/>
+            <a:off x="5986841" y="67606"/>
+            <a:ext cx="5153383" cy="6655166"/>
           </a:xfrm>
           <a:prstGeom prst="rect">
             <a:avLst/>

</xml_diff>